<commit_message>
updated slides for PLDI 16 tutorial on Jalangi
</commit_message>
<xml_diff>
--- a/docs/jalangi-pldi16.pptx
+++ b/docs/jalangi-pldi16.pptx
@@ -4323,10 +4323,19 @@
                 </a:solidFill>
                 <a:cs typeface="+mn-cs"/>
               </a:rPr>
-              <a:t> Liang Gong, Koushik </a:t>
-            </a:r>
-            <a:r>
-              <a:rPr lang="en-US" sz="2800" b="1" dirty="0" smtClean="0">
+              <a:t> Liang Gong, </a:t>
+            </a:r>
+            <a:r>
+              <a:rPr lang="en-US" sz="2800" b="1" u="sng" dirty="0" smtClean="0">
+                <a:solidFill>
+                  <a:srgbClr val="008000"/>
+                </a:solidFill>
+                <a:cs typeface="+mn-cs"/>
+              </a:rPr>
+              <a:t>Koushik </a:t>
+            </a:r>
+            <a:r>
+              <a:rPr lang="en-US" sz="2800" b="1" u="sng" dirty="0" smtClean="0">
                 <a:solidFill>
                   <a:srgbClr val="008000"/>
                 </a:solidFill>
@@ -15204,8 +15213,22 @@
           <a:bodyPr/>
           <a:lstStyle/>
           <a:p>
-            <a:r>
-              <a:rPr lang="en-US" sz="1600" i="1" dirty="0"/>
+            <a:pPr marL="0" indent="0">
+              <a:buNone/>
+            </a:pPr>
+            <a:r>
+              <a:rPr lang="en-US" sz="1800" b="1" dirty="0" smtClean="0"/>
+              <a:t>For </a:t>
+            </a:r>
+            <a:r>
+              <a:rPr lang="en-US" sz="1800" b="1" dirty="0" err="1" smtClean="0"/>
+              <a:t>Node.js</a:t>
+            </a:r>
+            <a:endParaRPr lang="en-US" sz="1800" b="1" dirty="0" smtClean="0"/>
+          </a:p>
+          <a:p>
+            <a:r>
+              <a:rPr lang="en-US" sz="1600" i="1" dirty="0" smtClean="0"/>
               <a:t>node </a:t>
             </a:r>
             <a:r>
@@ -15348,6 +15371,15 @@
               <a:rPr lang="en-US" sz="1600" i="1" dirty="0"/>
             </a:br>
             <a:endParaRPr lang="en-US" sz="1600" i="1" dirty="0" smtClean="0"/>
+          </a:p>
+          <a:p>
+            <a:pPr marL="0" indent="0">
+              <a:buNone/>
+            </a:pPr>
+            <a:r>
+              <a:rPr lang="en-US" sz="1800" b="1" dirty="0" smtClean="0"/>
+              <a:t>For browser:</a:t>
+            </a:r>
           </a:p>
           <a:p>
             <a:r>
@@ -16597,6 +16629,30 @@
           </a:p>
         </p:txBody>
       </p:sp>
+      <p:pic>
+        <p:nvPicPr>
+          <p:cNvPr id="5" name="Picture 4"/>
+          <p:cNvPicPr>
+            <a:picLocks noChangeAspect="1"/>
+          </p:cNvPicPr>
+          <p:nvPr/>
+        </p:nvPicPr>
+        <p:blipFill>
+          <a:blip r:embed="rId2"/>
+          <a:stretch>
+            <a:fillRect/>
+          </a:stretch>
+        </p:blipFill>
+        <p:spPr>
+          <a:xfrm>
+            <a:off x="6705600" y="2526798"/>
+            <a:ext cx="2438400" cy="4331202"/>
+          </a:xfrm>
+          <a:prstGeom prst="rect">
+            <a:avLst/>
+          </a:prstGeom>
+        </p:spPr>
+      </p:pic>
     </p:spTree>
     <p:extLst>
       <p:ext uri="{BB962C8B-B14F-4D97-AF65-F5344CB8AC3E}">
@@ -20125,7 +20181,7 @@
           <a:p>
             <a:r>
               <a:rPr lang="en-US" dirty="0" smtClean="0"/>
-              <a:t>Log All Load and Stores</a:t>
+              <a:t>Log All Loads and Stores</a:t>
             </a:r>
             <a:endParaRPr lang="en-US" dirty="0"/>
           </a:p>
@@ -21035,7 +21091,19 @@
             </a:br>
             <a:r>
               <a:rPr lang="en-US" sz="3200" dirty="0" smtClean="0"/>
-              <a:t>interpret ‘-’ as ‘*’</a:t>
+              <a:t>interpret </a:t>
+            </a:r>
+            <a:r>
+              <a:rPr lang="en-US" sz="3200" dirty="0" smtClean="0"/>
+              <a:t>‘*’ </a:t>
+            </a:r>
+            <a:r>
+              <a:rPr lang="en-US" sz="3200" dirty="0" smtClean="0"/>
+              <a:t>as </a:t>
+            </a:r>
+            <a:r>
+              <a:rPr lang="en-US" sz="3200" dirty="0" smtClean="0"/>
+              <a:t>‘+’</a:t>
             </a:r>
             <a:endParaRPr lang="en-US" sz="3200" dirty="0"/>
           </a:p>
@@ -24419,8 +24487,13 @@
           <a:p>
             <a:r>
               <a:rPr lang="en-US" sz="2800" dirty="0" smtClean="0"/>
-              <a:t>Change semantics of operators</a:t>
-            </a:r>
+              <a:t>Change semantics of </a:t>
+            </a:r>
+            <a:r>
+              <a:rPr lang="en-US" sz="2800" dirty="0" smtClean="0"/>
+              <a:t>operators/functions</a:t>
+            </a:r>
+            <a:endParaRPr lang="en-US" sz="2800" dirty="0" smtClean="0"/>
           </a:p>
           <a:p>
             <a:r>

</xml_diff>